<commit_message>
Final initial presentation 2
</commit_message>
<xml_diff>
--- a/Final-InitialPresentation.pptx
+++ b/Final-InitialPresentation.pptx
@@ -6701,11 +6701,11 @@
   <p:clrMapOvr>
     <a:masterClrMapping/>
   </p:clrMapOvr>
-  <mc:AlternateContent xmlns:mc="http://schemas.openxmlformats.org/markup-compatibility/2006">
-    <mc:Choice xmlns:p14="http://schemas.microsoft.com/office/powerpoint/2010/main" Requires="p14">
+  <mc:AlternateContent xmlns:mc="http://schemas.openxmlformats.org/markup-compatibility/2006" xmlns:p14="http://schemas.microsoft.com/office/powerpoint/2010/main">
+    <mc:Choice Requires="p14">
       <p:transition spd="slow" p14:dur="2000"/>
     </mc:Choice>
-    <mc:Fallback>
+    <mc:Fallback xmlns="">
       <p:transition spd="slow"/>
     </mc:Fallback>
   </mc:AlternateContent>
@@ -6978,7 +6978,7 @@
         <p:spPr/>
         <p:txBody>
           <a:bodyPr>
-            <a:normAutofit fontScale="92500" lnSpcReduction="20000"/>
+            <a:normAutofit fontScale="92500" lnSpcReduction="10000"/>
           </a:bodyPr>
           <a:lstStyle/>
           <a:p>
@@ -6995,31 +6995,52 @@
                 <a:latin typeface="Times New Roman" panose="02020603050405020304" pitchFamily="18" charset="0"/>
                 <a:cs typeface="Times New Roman" panose="02020603050405020304" pitchFamily="18" charset="0"/>
               </a:rPr>
-              <a:t>a user, I need to be able to post a ride with details including time, date, origin, destination, and whether I’m a driver or a rider (Ideal Hours: 33</a:t>
+              <a:t>a user, I need to be able to </a:t>
             </a:r>
             <a:r>
               <a:rPr lang="en-US" sz="2600" dirty="0" smtClean="0">
                 <a:latin typeface="Times New Roman" panose="02020603050405020304" pitchFamily="18" charset="0"/>
                 <a:cs typeface="Times New Roman" panose="02020603050405020304" pitchFamily="18" charset="0"/>
               </a:rPr>
-              <a:t>)</a:t>
-            </a:r>
-          </a:p>
-          <a:p>
-            <a:pPr lvl="1"/>
+              <a:t>post details about a ride depending on whether I am </a:t>
+            </a:r>
+            <a:r>
+              <a:rPr lang="en-US" sz="2600" dirty="0">
+                <a:latin typeface="Times New Roman" panose="02020603050405020304" pitchFamily="18" charset="0"/>
+                <a:cs typeface="Times New Roman" panose="02020603050405020304" pitchFamily="18" charset="0"/>
+              </a:rPr>
+              <a:t>a driver or a rider (Ideal Hours: 33</a:t>
+            </a:r>
             <a:r>
               <a:rPr lang="en-US" sz="2600" dirty="0" smtClean="0">
                 <a:latin typeface="Times New Roman" panose="02020603050405020304" pitchFamily="18" charset="0"/>
                 <a:cs typeface="Times New Roman" panose="02020603050405020304" pitchFamily="18" charset="0"/>
               </a:rPr>
+              <a:t>)</a:t>
+            </a:r>
+          </a:p>
+          <a:p>
+            <a:pPr lvl="1"/>
+            <a:r>
+              <a:rPr lang="en-US" sz="2600" dirty="0" smtClean="0">
+                <a:latin typeface="Times New Roman" panose="02020603050405020304" pitchFamily="18" charset="0"/>
+                <a:cs typeface="Times New Roman" panose="02020603050405020304" pitchFamily="18" charset="0"/>
+              </a:rPr>
               <a:t> </a:t>
+            </a:r>
+            <a:r>
+              <a:rPr lang="en-US" sz="2600" dirty="0" smtClean="0">
+                <a:latin typeface="Times New Roman" panose="02020603050405020304" pitchFamily="18" charset="0"/>
+                <a:cs typeface="Times New Roman" panose="02020603050405020304" pitchFamily="18" charset="0"/>
+              </a:rPr>
+              <a:t>To be </a:t>
             </a:r>
             <a:r>
               <a:rPr lang="en-US" sz="2600" dirty="0">
                 <a:latin typeface="Times New Roman" panose="02020603050405020304" pitchFamily="18" charset="0"/>
                 <a:cs typeface="Times New Roman" panose="02020603050405020304" pitchFamily="18" charset="0"/>
               </a:rPr>
-              <a:t>Be able to post </a:t>
+              <a:t>able to post </a:t>
             </a:r>
             <a:r>
               <a:rPr lang="en-US" sz="2600" dirty="0" smtClean="0">
@@ -7029,11 +7050,11 @@
               <a:t>for </a:t>
             </a:r>
             <a:r>
-              <a:rPr lang="en-US" sz="2600" dirty="0">
+              <a:rPr lang="en-US" sz="2600" dirty="0" smtClean="0">
                 <a:latin typeface="Times New Roman" panose="02020603050405020304" pitchFamily="18" charset="0"/>
                 <a:cs typeface="Times New Roman" panose="02020603050405020304" pitchFamily="18" charset="0"/>
               </a:rPr>
-              <a:t>rides using certain </a:t>
+              <a:t>a ride with certain </a:t>
             </a:r>
             <a:r>
               <a:rPr lang="en-US" sz="2600" dirty="0" smtClean="0">
@@ -7463,7 +7484,21 @@
                 <a:latin typeface="Times New Roman" panose="02020603050405020304" pitchFamily="18" charset="0"/>
                 <a:cs typeface="Times New Roman" panose="02020603050405020304" pitchFamily="18" charset="0"/>
               </a:rPr>
-              <a:t>As a user, I need to have a visually pleasing website so that I have a more enjoyable experience  (Ideal Hours: 12</a:t>
+              <a:t>As a user, I need to have a visually pleasing website so that I </a:t>
+            </a:r>
+            <a:r>
+              <a:rPr lang="en-US" sz="2400" dirty="0" smtClean="0">
+                <a:latin typeface="Times New Roman" panose="02020603050405020304" pitchFamily="18" charset="0"/>
+                <a:cs typeface="Times New Roman" panose="02020603050405020304" pitchFamily="18" charset="0"/>
+              </a:rPr>
+              <a:t>can have </a:t>
+            </a:r>
+            <a:r>
+              <a:rPr lang="en-US" sz="2400" dirty="0">
+                <a:latin typeface="Times New Roman" panose="02020603050405020304" pitchFamily="18" charset="0"/>
+                <a:cs typeface="Times New Roman" panose="02020603050405020304" pitchFamily="18" charset="0"/>
+              </a:rPr>
+              <a:t>a more enjoyable experience  (Ideal Hours: 12</a:t>
             </a:r>
             <a:r>
               <a:rPr lang="en-US" sz="2400" dirty="0" smtClean="0">

</xml_diff>